<commit_message>
[PM] Update release process doc
</commit_message>
<xml_diff>
--- a/Pharmacy/Docs/[PM]PharmacyReleaseProcess.pptx
+++ b/Pharmacy/Docs/[PM]PharmacyReleaseProcess.pptx
@@ -105,6 +105,11 @@
       </a:defRPr>
     </a:lvl9pPr>
   </p:defaultTextStyle>
+  <p:extLst>
+    <p:ext uri="{EFAFB233-063F-42B5-8137-9DF3F51BA10A}">
+      <p15:sldGuideLst xmlns:p15="http://schemas.microsoft.com/office/powerpoint/2012/main"/>
+    </p:ext>
+  </p:extLst>
 </p:presentation>
 </file>
 
@@ -239,7 +244,7 @@
           <a:p>
             <a:fld id="{8C9AA36F-5840-40BE-B4B1-251D9F0FA661}" type="datetimeFigureOut">
               <a:rPr lang="en-US" smtClean="0"/>
-              <a:t>5/17/2021</a:t>
+              <a:t>7/21/2021</a:t>
             </a:fld>
             <a:endParaRPr lang="en-US"/>
           </a:p>
@@ -409,7 +414,7 @@
           <a:p>
             <a:fld id="{8C9AA36F-5840-40BE-B4B1-251D9F0FA661}" type="datetimeFigureOut">
               <a:rPr lang="en-US" smtClean="0"/>
-              <a:t>5/17/2021</a:t>
+              <a:t>7/21/2021</a:t>
             </a:fld>
             <a:endParaRPr lang="en-US"/>
           </a:p>
@@ -589,7 +594,7 @@
           <a:p>
             <a:fld id="{8C9AA36F-5840-40BE-B4B1-251D9F0FA661}" type="datetimeFigureOut">
               <a:rPr lang="en-US" smtClean="0"/>
-              <a:t>5/17/2021</a:t>
+              <a:t>7/21/2021</a:t>
             </a:fld>
             <a:endParaRPr lang="en-US"/>
           </a:p>
@@ -759,7 +764,7 @@
           <a:p>
             <a:fld id="{8C9AA36F-5840-40BE-B4B1-251D9F0FA661}" type="datetimeFigureOut">
               <a:rPr lang="en-US" smtClean="0"/>
-              <a:t>5/17/2021</a:t>
+              <a:t>7/21/2021</a:t>
             </a:fld>
             <a:endParaRPr lang="en-US"/>
           </a:p>
@@ -1005,7 +1010,7 @@
           <a:p>
             <a:fld id="{8C9AA36F-5840-40BE-B4B1-251D9F0FA661}" type="datetimeFigureOut">
               <a:rPr lang="en-US" smtClean="0"/>
-              <a:t>5/17/2021</a:t>
+              <a:t>7/21/2021</a:t>
             </a:fld>
             <a:endParaRPr lang="en-US"/>
           </a:p>
@@ -1237,7 +1242,7 @@
           <a:p>
             <a:fld id="{8C9AA36F-5840-40BE-B4B1-251D9F0FA661}" type="datetimeFigureOut">
               <a:rPr lang="en-US" smtClean="0"/>
-              <a:t>5/17/2021</a:t>
+              <a:t>7/21/2021</a:t>
             </a:fld>
             <a:endParaRPr lang="en-US"/>
           </a:p>
@@ -1604,7 +1609,7 @@
           <a:p>
             <a:fld id="{8C9AA36F-5840-40BE-B4B1-251D9F0FA661}" type="datetimeFigureOut">
               <a:rPr lang="en-US" smtClean="0"/>
-              <a:t>5/17/2021</a:t>
+              <a:t>7/21/2021</a:t>
             </a:fld>
             <a:endParaRPr lang="en-US"/>
           </a:p>
@@ -1722,7 +1727,7 @@
           <a:p>
             <a:fld id="{8C9AA36F-5840-40BE-B4B1-251D9F0FA661}" type="datetimeFigureOut">
               <a:rPr lang="en-US" smtClean="0"/>
-              <a:t>5/17/2021</a:t>
+              <a:t>7/21/2021</a:t>
             </a:fld>
             <a:endParaRPr lang="en-US"/>
           </a:p>
@@ -1817,7 +1822,7 @@
           <a:p>
             <a:fld id="{8C9AA36F-5840-40BE-B4B1-251D9F0FA661}" type="datetimeFigureOut">
               <a:rPr lang="en-US" smtClean="0"/>
-              <a:t>5/17/2021</a:t>
+              <a:t>7/21/2021</a:t>
             </a:fld>
             <a:endParaRPr lang="en-US"/>
           </a:p>
@@ -2094,7 +2099,7 @@
           <a:p>
             <a:fld id="{8C9AA36F-5840-40BE-B4B1-251D9F0FA661}" type="datetimeFigureOut">
               <a:rPr lang="en-US" smtClean="0"/>
-              <a:t>5/17/2021</a:t>
+              <a:t>7/21/2021</a:t>
             </a:fld>
             <a:endParaRPr lang="en-US"/>
           </a:p>
@@ -2347,7 +2352,7 @@
           <a:p>
             <a:fld id="{8C9AA36F-5840-40BE-B4B1-251D9F0FA661}" type="datetimeFigureOut">
               <a:rPr lang="en-US" smtClean="0"/>
-              <a:t>5/17/2021</a:t>
+              <a:t>7/21/2021</a:t>
             </a:fld>
             <a:endParaRPr lang="en-US"/>
           </a:p>
@@ -2560,7 +2565,7 @@
           <a:p>
             <a:fld id="{8C9AA36F-5840-40BE-B4B1-251D9F0FA661}" type="datetimeFigureOut">
               <a:rPr lang="en-US" smtClean="0"/>
-              <a:t>5/17/2021</a:t>
+              <a:t>7/21/2021</a:t>
             </a:fld>
             <a:endParaRPr lang="en-US"/>
           </a:p>

</xml_diff>